<commit_message>
saving updates to test files and presentation
</commit_message>
<xml_diff>
--- a/presentation/unittestingintro.pptx
+++ b/presentation/unittestingintro.pptx
@@ -133,7 +133,7 @@
   </p:defaultTextStyle>
   <p:extLst>
     <p:ext uri="{EFAFB233-063F-42B5-8137-9DF3F51BA10A}">
-      <p15:sldGuideLst xmlns:p15="http://schemas.microsoft.com/office/powerpoint/2012/main" xmlns="">
+      <p15:sldGuideLst xmlns="" xmlns:p15="http://schemas.microsoft.com/office/powerpoint/2012/main">
         <p15:guide id="1" orient="horz" pos="99">
           <p15:clr>
             <a:srgbClr val="A4A3A4"/>
@@ -237,7 +237,7 @@
       </p15:sldGuideLst>
     </p:ext>
     <p:ext uri="{2D200454-40CA-4A62-9FC3-DE9A4176ACB9}">
-      <p15:notesGuideLst xmlns:p15="http://schemas.microsoft.com/office/powerpoint/2012/main" xmlns="">
+      <p15:notesGuideLst xmlns="" xmlns:p15="http://schemas.microsoft.com/office/powerpoint/2012/main">
         <p15:guide id="1" orient="horz" pos="2880">
           <p15:clr>
             <a:srgbClr val="A4A3A4"/>
@@ -336,7 +336,7 @@
           <a:p>
             <a:fld id="{84ECF399-9508-4462-A795-CE79BA4B78DF}" type="datetimeFigureOut">
               <a:rPr lang="en-GB" smtClean="0"/>
-              <a:t>18/07/2019</a:t>
+              <a:t>22/07/2019</a:t>
             </a:fld>
             <a:endParaRPr lang="en-GB"/>
           </a:p>
@@ -501,7 +501,7 @@
           <a:p>
             <a:fld id="{942A2578-3272-43A6-B760-34BB1F24A93B}" type="datetimeFigureOut">
               <a:rPr lang="en-GB" smtClean="0"/>
-              <a:t>18/07/2019</a:t>
+              <a:t>22/07/2019</a:t>
             </a:fld>
             <a:endParaRPr lang="en-GB"/>
           </a:p>
@@ -4274,7 +4274,7 @@
           <p:cNvPr id="9" name="Text Placeholder 1">
             <a:extLst>
               <a:ext uri="{FF2B5EF4-FFF2-40B4-BE49-F238E27FC236}">
-                <a16:creationId xmlns:a16="http://schemas.microsoft.com/office/drawing/2014/main" xmlns="" id="{E1AEEF35-7430-4190-B1E4-D2447633D22E}"/>
+                <a16:creationId xmlns="" xmlns:a16="http://schemas.microsoft.com/office/drawing/2014/main" id="{E1AEEF35-7430-4190-B1E4-D2447633D22E}"/>
               </a:ext>
             </a:extLst>
           </p:cNvPr>
@@ -4326,7 +4326,7 @@
           <p:cNvPr id="10" name="Text Placeholder 2">
             <a:extLst>
               <a:ext uri="{FF2B5EF4-FFF2-40B4-BE49-F238E27FC236}">
-                <a16:creationId xmlns:a16="http://schemas.microsoft.com/office/drawing/2014/main" xmlns="" id="{72A9D36E-978C-40A9-B7B6-1D3B41514DBD}"/>
+                <a16:creationId xmlns="" xmlns:a16="http://schemas.microsoft.com/office/drawing/2014/main" id="{72A9D36E-978C-40A9-B7B6-1D3B41514DBD}"/>
               </a:ext>
             </a:extLst>
           </p:cNvPr>
@@ -4368,7 +4368,7 @@
           <p:cNvPr id="43" name="Text Placeholder 1">
             <a:extLst>
               <a:ext uri="{FF2B5EF4-FFF2-40B4-BE49-F238E27FC236}">
-                <a16:creationId xmlns:a16="http://schemas.microsoft.com/office/drawing/2014/main" xmlns="" id="{E1AEEF35-7430-4190-B1E4-D2447633D22E}"/>
+                <a16:creationId xmlns="" xmlns:a16="http://schemas.microsoft.com/office/drawing/2014/main" id="{E1AEEF35-7430-4190-B1E4-D2447633D22E}"/>
               </a:ext>
             </a:extLst>
           </p:cNvPr>
@@ -4420,7 +4420,7 @@
           <p:cNvPr id="44" name="Text Placeholder 2">
             <a:extLst>
               <a:ext uri="{FF2B5EF4-FFF2-40B4-BE49-F238E27FC236}">
-                <a16:creationId xmlns:a16="http://schemas.microsoft.com/office/drawing/2014/main" xmlns="" id="{72A9D36E-978C-40A9-B7B6-1D3B41514DBD}"/>
+                <a16:creationId xmlns="" xmlns:a16="http://schemas.microsoft.com/office/drawing/2014/main" id="{72A9D36E-978C-40A9-B7B6-1D3B41514DBD}"/>
               </a:ext>
             </a:extLst>
           </p:cNvPr>
@@ -4462,7 +4462,7 @@
           <p:cNvPr id="45" name="Text Placeholder 1">
             <a:extLst>
               <a:ext uri="{FF2B5EF4-FFF2-40B4-BE49-F238E27FC236}">
-                <a16:creationId xmlns:a16="http://schemas.microsoft.com/office/drawing/2014/main" xmlns="" id="{E1AEEF35-7430-4190-B1E4-D2447633D22E}"/>
+                <a16:creationId xmlns="" xmlns:a16="http://schemas.microsoft.com/office/drawing/2014/main" id="{E1AEEF35-7430-4190-B1E4-D2447633D22E}"/>
               </a:ext>
             </a:extLst>
           </p:cNvPr>
@@ -4514,7 +4514,7 @@
           <p:cNvPr id="46" name="Text Placeholder 2">
             <a:extLst>
               <a:ext uri="{FF2B5EF4-FFF2-40B4-BE49-F238E27FC236}">
-                <a16:creationId xmlns:a16="http://schemas.microsoft.com/office/drawing/2014/main" xmlns="" id="{72A9D36E-978C-40A9-B7B6-1D3B41514DBD}"/>
+                <a16:creationId xmlns="" xmlns:a16="http://schemas.microsoft.com/office/drawing/2014/main" id="{72A9D36E-978C-40A9-B7B6-1D3B41514DBD}"/>
               </a:ext>
             </a:extLst>
           </p:cNvPr>
@@ -4556,7 +4556,7 @@
           <p:cNvPr id="47" name="Text Placeholder 1">
             <a:extLst>
               <a:ext uri="{FF2B5EF4-FFF2-40B4-BE49-F238E27FC236}">
-                <a16:creationId xmlns:a16="http://schemas.microsoft.com/office/drawing/2014/main" xmlns="" id="{E1AEEF35-7430-4190-B1E4-D2447633D22E}"/>
+                <a16:creationId xmlns="" xmlns:a16="http://schemas.microsoft.com/office/drawing/2014/main" id="{E1AEEF35-7430-4190-B1E4-D2447633D22E}"/>
               </a:ext>
             </a:extLst>
           </p:cNvPr>
@@ -4608,7 +4608,7 @@
           <p:cNvPr id="48" name="Text Placeholder 2">
             <a:extLst>
               <a:ext uri="{FF2B5EF4-FFF2-40B4-BE49-F238E27FC236}">
-                <a16:creationId xmlns:a16="http://schemas.microsoft.com/office/drawing/2014/main" xmlns="" id="{72A9D36E-978C-40A9-B7B6-1D3B41514DBD}"/>
+                <a16:creationId xmlns="" xmlns:a16="http://schemas.microsoft.com/office/drawing/2014/main" id="{72A9D36E-978C-40A9-B7B6-1D3B41514DBD}"/>
               </a:ext>
             </a:extLst>
           </p:cNvPr>
@@ -10585,7 +10585,7 @@
           <p:cNvPr id="25" name="Straight Connector 24">
             <a:extLst>
               <a:ext uri="{FF2B5EF4-FFF2-40B4-BE49-F238E27FC236}">
-                <a16:creationId xmlns:a16="http://schemas.microsoft.com/office/drawing/2014/main" xmlns="" id="{2A032BDD-E6FE-4A1E-9741-60886BDBCC86}"/>
+                <a16:creationId xmlns="" xmlns:a16="http://schemas.microsoft.com/office/drawing/2014/main" id="{2A032BDD-E6FE-4A1E-9741-60886BDBCC86}"/>
               </a:ext>
             </a:extLst>
           </p:cNvPr>
@@ -12286,7 +12286,7 @@
           <p:cNvPr id="32" name="Oval 31">
             <a:extLst>
               <a:ext uri="{FF2B5EF4-FFF2-40B4-BE49-F238E27FC236}">
-                <a16:creationId xmlns:a16="http://schemas.microsoft.com/office/drawing/2014/main" xmlns="" id="{85722348-DF80-4DCF-A5FF-C530FF3D3A43}"/>
+                <a16:creationId xmlns="" xmlns:a16="http://schemas.microsoft.com/office/drawing/2014/main" id="{85722348-DF80-4DCF-A5FF-C530FF3D3A43}"/>
               </a:ext>
             </a:extLst>
           </p:cNvPr>
@@ -12369,7 +12369,7 @@
           <p:cNvPr id="46" name="Oval 45">
             <a:extLst>
               <a:ext uri="{FF2B5EF4-FFF2-40B4-BE49-F238E27FC236}">
-                <a16:creationId xmlns:a16="http://schemas.microsoft.com/office/drawing/2014/main" xmlns="" id="{85722348-DF80-4DCF-A5FF-C530FF3D3A43}"/>
+                <a16:creationId xmlns="" xmlns:a16="http://schemas.microsoft.com/office/drawing/2014/main" id="{85722348-DF80-4DCF-A5FF-C530FF3D3A43}"/>
               </a:ext>
             </a:extLst>
           </p:cNvPr>
@@ -12452,7 +12452,7 @@
           <p:cNvPr id="47" name="Oval 46">
             <a:extLst>
               <a:ext uri="{FF2B5EF4-FFF2-40B4-BE49-F238E27FC236}">
-                <a16:creationId xmlns:a16="http://schemas.microsoft.com/office/drawing/2014/main" xmlns="" id="{85722348-DF80-4DCF-A5FF-C530FF3D3A43}"/>
+                <a16:creationId xmlns="" xmlns:a16="http://schemas.microsoft.com/office/drawing/2014/main" id="{85722348-DF80-4DCF-A5FF-C530FF3D3A43}"/>
               </a:ext>
             </a:extLst>
           </p:cNvPr>
@@ -12535,7 +12535,7 @@
           <p:cNvPr id="48" name="Oval 47">
             <a:extLst>
               <a:ext uri="{FF2B5EF4-FFF2-40B4-BE49-F238E27FC236}">
-                <a16:creationId xmlns:a16="http://schemas.microsoft.com/office/drawing/2014/main" xmlns="" id="{85722348-DF80-4DCF-A5FF-C530FF3D3A43}"/>
+                <a16:creationId xmlns="" xmlns:a16="http://schemas.microsoft.com/office/drawing/2014/main" id="{85722348-DF80-4DCF-A5FF-C530FF3D3A43}"/>
               </a:ext>
             </a:extLst>
           </p:cNvPr>
@@ -12618,7 +12618,7 @@
           <p:cNvPr id="49" name="Oval 48">
             <a:extLst>
               <a:ext uri="{FF2B5EF4-FFF2-40B4-BE49-F238E27FC236}">
-                <a16:creationId xmlns:a16="http://schemas.microsoft.com/office/drawing/2014/main" xmlns="" id="{85722348-DF80-4DCF-A5FF-C530FF3D3A43}"/>
+                <a16:creationId xmlns="" xmlns:a16="http://schemas.microsoft.com/office/drawing/2014/main" id="{85722348-DF80-4DCF-A5FF-C530FF3D3A43}"/>
               </a:ext>
             </a:extLst>
           </p:cNvPr>
@@ -12945,7 +12945,7 @@
           <p:cNvPr id="25" name="Straight Connector 24">
             <a:extLst>
               <a:ext uri="{FF2B5EF4-FFF2-40B4-BE49-F238E27FC236}">
-                <a16:creationId xmlns:a16="http://schemas.microsoft.com/office/drawing/2014/main" xmlns="" id="{2A032BDD-E6FE-4A1E-9741-60886BDBCC86}"/>
+                <a16:creationId xmlns="" xmlns:a16="http://schemas.microsoft.com/office/drawing/2014/main" id="{2A032BDD-E6FE-4A1E-9741-60886BDBCC86}"/>
               </a:ext>
             </a:extLst>
           </p:cNvPr>
@@ -12993,7 +12993,7 @@
           <p:cNvPr id="34" name="Oval 33">
             <a:extLst>
               <a:ext uri="{FF2B5EF4-FFF2-40B4-BE49-F238E27FC236}">
-                <a16:creationId xmlns:a16="http://schemas.microsoft.com/office/drawing/2014/main" xmlns="" id="{3FC25BAC-207E-4BD9-B71D-67244181E8A7}"/>
+                <a16:creationId xmlns="" xmlns:a16="http://schemas.microsoft.com/office/drawing/2014/main" id="{3FC25BAC-207E-4BD9-B71D-67244181E8A7}"/>
               </a:ext>
             </a:extLst>
           </p:cNvPr>
@@ -13076,7 +13076,7 @@
           <p:cNvPr id="35" name="Oval 34">
             <a:extLst>
               <a:ext uri="{FF2B5EF4-FFF2-40B4-BE49-F238E27FC236}">
-                <a16:creationId xmlns:a16="http://schemas.microsoft.com/office/drawing/2014/main" xmlns="" id="{6ECEA8AF-DB7B-44B5-A5A9-05718517D3A8}"/>
+                <a16:creationId xmlns="" xmlns:a16="http://schemas.microsoft.com/office/drawing/2014/main" id="{6ECEA8AF-DB7B-44B5-A5A9-05718517D3A8}"/>
               </a:ext>
             </a:extLst>
           </p:cNvPr>
@@ -13159,7 +13159,7 @@
           <p:cNvPr id="36" name="Oval 35">
             <a:extLst>
               <a:ext uri="{FF2B5EF4-FFF2-40B4-BE49-F238E27FC236}">
-                <a16:creationId xmlns:a16="http://schemas.microsoft.com/office/drawing/2014/main" xmlns="" id="{76041FD2-302D-4528-B197-4818DC231D79}"/>
+                <a16:creationId xmlns="" xmlns:a16="http://schemas.microsoft.com/office/drawing/2014/main" id="{76041FD2-302D-4528-B197-4818DC231D79}"/>
               </a:ext>
             </a:extLst>
           </p:cNvPr>
@@ -13242,7 +13242,7 @@
           <p:cNvPr id="37" name="Oval 36">
             <a:extLst>
               <a:ext uri="{FF2B5EF4-FFF2-40B4-BE49-F238E27FC236}">
-                <a16:creationId xmlns:a16="http://schemas.microsoft.com/office/drawing/2014/main" xmlns="" id="{4918B22A-8AD3-4D04-AFDE-7B146EE2D7C3}"/>
+                <a16:creationId xmlns="" xmlns:a16="http://schemas.microsoft.com/office/drawing/2014/main" id="{4918B22A-8AD3-4D04-AFDE-7B146EE2D7C3}"/>
               </a:ext>
             </a:extLst>
           </p:cNvPr>
@@ -13325,7 +13325,7 @@
           <p:cNvPr id="38" name="Oval 37">
             <a:extLst>
               <a:ext uri="{FF2B5EF4-FFF2-40B4-BE49-F238E27FC236}">
-                <a16:creationId xmlns:a16="http://schemas.microsoft.com/office/drawing/2014/main" xmlns="" id="{C02F3EF3-5D54-43B3-8D77-B49AA8FBB079}"/>
+                <a16:creationId xmlns="" xmlns:a16="http://schemas.microsoft.com/office/drawing/2014/main" id="{C02F3EF3-5D54-43B3-8D77-B49AA8FBB079}"/>
               </a:ext>
             </a:extLst>
           </p:cNvPr>
@@ -13408,7 +13408,7 @@
           <p:cNvPr id="39" name="Oval 38">
             <a:extLst>
               <a:ext uri="{FF2B5EF4-FFF2-40B4-BE49-F238E27FC236}">
-                <a16:creationId xmlns:a16="http://schemas.microsoft.com/office/drawing/2014/main" xmlns="" id="{AEBB2BB8-86E4-4CA5-9D29-9AA8E28C552B}"/>
+                <a16:creationId xmlns="" xmlns:a16="http://schemas.microsoft.com/office/drawing/2014/main" id="{AEBB2BB8-86E4-4CA5-9D29-9AA8E28C552B}"/>
               </a:ext>
             </a:extLst>
           </p:cNvPr>
@@ -30188,21 +30188,21 @@
                 <a:gridCol w="4554908">
                   <a:extLst>
                     <a:ext uri="{9D8B030D-6E8A-4147-A177-3AD203B41FA5}">
-                      <a16:colId xmlns:a16="http://schemas.microsoft.com/office/drawing/2014/main" xmlns="" val="20000"/>
+                      <a16:colId xmlns="" xmlns:a16="http://schemas.microsoft.com/office/drawing/2014/main" val="20000"/>
                     </a:ext>
                   </a:extLst>
                 </a:gridCol>
                 <a:gridCol w="734939">
                   <a:extLst>
                     <a:ext uri="{9D8B030D-6E8A-4147-A177-3AD203B41FA5}">
-                      <a16:colId xmlns:a16="http://schemas.microsoft.com/office/drawing/2014/main" xmlns="" val="20001"/>
+                      <a16:colId xmlns="" xmlns:a16="http://schemas.microsoft.com/office/drawing/2014/main" val="20001"/>
                     </a:ext>
                   </a:extLst>
                 </a:gridCol>
                 <a:gridCol w="5888054">
                   <a:extLst>
                     <a:ext uri="{9D8B030D-6E8A-4147-A177-3AD203B41FA5}">
-                      <a16:colId xmlns:a16="http://schemas.microsoft.com/office/drawing/2014/main" xmlns="" val="20002"/>
+                      <a16:colId xmlns="" xmlns:a16="http://schemas.microsoft.com/office/drawing/2014/main" val="20002"/>
                     </a:ext>
                   </a:extLst>
                 </a:gridCol>
@@ -30599,7 +30599,7 @@
                 </a:tc>
                 <a:extLst>
                   <a:ext uri="{0D108BD9-81ED-4DB2-BD59-A6C34878D82A}">
-                    <a16:rowId xmlns:a16="http://schemas.microsoft.com/office/drawing/2014/main" xmlns="" val="10000"/>
+                    <a16:rowId xmlns="" xmlns:a16="http://schemas.microsoft.com/office/drawing/2014/main" val="10000"/>
                   </a:ext>
                 </a:extLst>
               </a:tr>
@@ -30657,21 +30657,21 @@
                 <a:gridCol w="4554908">
                   <a:extLst>
                     <a:ext uri="{9D8B030D-6E8A-4147-A177-3AD203B41FA5}">
-                      <a16:colId xmlns:a16="http://schemas.microsoft.com/office/drawing/2014/main" xmlns="" val="20000"/>
+                      <a16:colId xmlns="" xmlns:a16="http://schemas.microsoft.com/office/drawing/2014/main" val="20000"/>
                     </a:ext>
                   </a:extLst>
                 </a:gridCol>
                 <a:gridCol w="734939">
                   <a:extLst>
                     <a:ext uri="{9D8B030D-6E8A-4147-A177-3AD203B41FA5}">
-                      <a16:colId xmlns:a16="http://schemas.microsoft.com/office/drawing/2014/main" xmlns="" val="20001"/>
+                      <a16:colId xmlns="" xmlns:a16="http://schemas.microsoft.com/office/drawing/2014/main" val="20001"/>
                     </a:ext>
                   </a:extLst>
                 </a:gridCol>
                 <a:gridCol w="5888054">
                   <a:extLst>
                     <a:ext uri="{9D8B030D-6E8A-4147-A177-3AD203B41FA5}">
-                      <a16:colId xmlns:a16="http://schemas.microsoft.com/office/drawing/2014/main" xmlns="" val="20002"/>
+                      <a16:colId xmlns="" xmlns:a16="http://schemas.microsoft.com/office/drawing/2014/main" val="20002"/>
                     </a:ext>
                   </a:extLst>
                 </a:gridCol>
@@ -31728,7 +31728,7 @@
                 </a:tc>
                 <a:extLst>
                   <a:ext uri="{0D108BD9-81ED-4DB2-BD59-A6C34878D82A}">
-                    <a16:rowId xmlns:a16="http://schemas.microsoft.com/office/drawing/2014/main" xmlns="" val="10000"/>
+                    <a16:rowId xmlns="" xmlns:a16="http://schemas.microsoft.com/office/drawing/2014/main" val="10000"/>
                   </a:ext>
                 </a:extLst>
               </a:tr>
@@ -34338,11 +34338,7 @@
             </a:r>
             <a:r>
               <a:rPr lang="en-US" dirty="0" smtClean="0"/>
-              <a:t> components </a:t>
-            </a:r>
-            <a:r>
-              <a:rPr lang="en-US" dirty="0" smtClean="0"/>
-              <a:t>requires </a:t>
+              <a:t> components requires </a:t>
             </a:r>
             <a:r>
               <a:rPr lang="en-US" dirty="0"/>
@@ -35499,7 +35495,7 @@
           <p:cNvPr id="2" name="Text Placeholder 1">
             <a:extLst>
               <a:ext uri="{FF2B5EF4-FFF2-40B4-BE49-F238E27FC236}">
-                <a16:creationId xmlns:a16="http://schemas.microsoft.com/office/drawing/2014/main" xmlns="" id="{520A7EFD-3596-43E3-BDB0-06ECA8094941}"/>
+                <a16:creationId xmlns="" xmlns:a16="http://schemas.microsoft.com/office/drawing/2014/main" id="{520A7EFD-3596-43E3-BDB0-06ECA8094941}"/>
               </a:ext>
             </a:extLst>
           </p:cNvPr>
@@ -35554,7 +35550,6 @@
               <a:rPr lang="en-US" dirty="0" smtClean="0"/>
               <a:t> repo also has a some resources and a copy of this presentation for future reference. </a:t>
             </a:r>
-            <a:endParaRPr lang="en-US" dirty="0" smtClean="0"/>
           </a:p>
           <a:p>
             <a:endParaRPr lang="en-US" dirty="0" smtClean="0"/>
@@ -35674,7 +35669,7 @@
           <p:cNvPr id="3" name="Title 2">
             <a:extLst>
               <a:ext uri="{FF2B5EF4-FFF2-40B4-BE49-F238E27FC236}">
-                <a16:creationId xmlns:a16="http://schemas.microsoft.com/office/drawing/2014/main" xmlns="" id="{48D5E28A-1E4A-4136-AC09-C631276F7665}"/>
+                <a16:creationId xmlns="" xmlns:a16="http://schemas.microsoft.com/office/drawing/2014/main" id="{48D5E28A-1E4A-4136-AC09-C631276F7665}"/>
               </a:ext>
             </a:extLst>
           </p:cNvPr>
@@ -35776,7 +35771,11 @@
             </a:pPr>
             <a:r>
               <a:rPr lang="en-US" dirty="0"/>
-              <a:t>Unit testing basics w/ jest</a:t>
+              <a:t>Unit testing basics w/ </a:t>
+            </a:r>
+            <a:r>
+              <a:rPr lang="en-US" dirty="0" smtClean="0"/>
+              <a:t>jest</a:t>
             </a:r>
           </a:p>
           <a:p>
@@ -35785,9 +35784,10 @@
               <a:buChar char="•"/>
             </a:pPr>
             <a:r>
-              <a:rPr lang="en-US" dirty="0"/>
-              <a:t>Mocking examples</a:t>
-            </a:r>
+              <a:rPr lang="en-US" dirty="0" smtClean="0"/>
+              <a:t>Mocking and stubbing </a:t>
+            </a:r>
+            <a:endParaRPr lang="en-US" dirty="0"/>
           </a:p>
           <a:p>
             <a:pPr marL="285750" indent="-285750">
@@ -35796,7 +35796,7 @@
             </a:pPr>
             <a:r>
               <a:rPr lang="en-US" dirty="0"/>
-              <a:t>Coverage Reporting</a:t>
+              <a:t>Mocking examples</a:t>
             </a:r>
           </a:p>
           <a:p>
@@ -35805,9 +35805,10 @@
               <a:buChar char="•"/>
             </a:pPr>
             <a:r>
-              <a:rPr lang="en-US" dirty="0"/>
+              <a:rPr lang="en-US" dirty="0" smtClean="0"/>
               <a:t>Exercises </a:t>
             </a:r>
+            <a:endParaRPr lang="en-US" dirty="0"/>
           </a:p>
           <a:p>
             <a:endParaRPr lang="en-US" dirty="0"/>
@@ -37938,7 +37939,7 @@
           <p:cNvPr id="3" name="Title 2">
             <a:extLst>
               <a:ext uri="{FF2B5EF4-FFF2-40B4-BE49-F238E27FC236}">
-                <a16:creationId xmlns:a16="http://schemas.microsoft.com/office/drawing/2014/main" xmlns="" id="{870FE32D-55EB-3F46-A319-A07CED6B7C01}"/>
+                <a16:creationId xmlns="" xmlns:a16="http://schemas.microsoft.com/office/drawing/2014/main" id="{870FE32D-55EB-3F46-A319-A07CED6B7C01}"/>
               </a:ext>
             </a:extLst>
           </p:cNvPr>
@@ -37967,7 +37968,7 @@
           <p:cNvPr id="6" name="Picture 5">
             <a:extLst>
               <a:ext uri="{FF2B5EF4-FFF2-40B4-BE49-F238E27FC236}">
-                <a16:creationId xmlns:a16="http://schemas.microsoft.com/office/drawing/2014/main" xmlns="" id="{94B37506-5E95-3A45-B75E-53F10C923674}"/>
+                <a16:creationId xmlns="" xmlns:a16="http://schemas.microsoft.com/office/drawing/2014/main" id="{94B37506-5E95-3A45-B75E-53F10C923674}"/>
               </a:ext>
             </a:extLst>
           </p:cNvPr>
@@ -39247,21 +39248,66 @@
           </a:p>
           <a:p>
             <a:r>
-              <a:rPr lang="en-US" i="1" u="sng" dirty="0"/>
+              <a:rPr lang="en-US" i="1" u="sng" dirty="0">
+                <a:solidFill>
+                  <a:srgbClr val="FF0000"/>
+                </a:solidFill>
+              </a:rPr>
               <a:t>Never write unit tests to meet code coverage requirements</a:t>
             </a:r>
             <a:r>
-              <a:rPr lang="en-US" dirty="0"/>
+              <a:rPr lang="en-US" dirty="0">
+                <a:solidFill>
+                  <a:srgbClr val="FF0000"/>
+                </a:solidFill>
+              </a:rPr>
               <a:t>, write units </a:t>
             </a:r>
             <a:r>
-              <a:rPr lang="en-US" dirty="0" smtClean="0"/>
-              <a:t>tests that make sense and established for testing functionality and reduce bugs in </a:t>
-            </a:r>
-            <a:r>
-              <a:rPr lang="en-US" dirty="0"/>
+              <a:rPr lang="en-US" dirty="0" smtClean="0">
+                <a:solidFill>
+                  <a:srgbClr val="FF0000"/>
+                </a:solidFill>
+              </a:rPr>
+              <a:t>tests that make sense </a:t>
+            </a:r>
+            <a:r>
+              <a:rPr lang="en-US" dirty="0" smtClean="0">
+                <a:solidFill>
+                  <a:srgbClr val="FF0000"/>
+                </a:solidFill>
+              </a:rPr>
+              <a:t>and established for testing functionality </a:t>
+            </a:r>
+            <a:r>
+              <a:rPr lang="en-US" dirty="0" smtClean="0">
+                <a:solidFill>
+                  <a:srgbClr val="FF0000"/>
+                </a:solidFill>
+              </a:rPr>
+              <a:t>and reduce bugs in </a:t>
+            </a:r>
+            <a:r>
+              <a:rPr lang="en-US" dirty="0">
+                <a:solidFill>
+                  <a:srgbClr val="FF0000"/>
+                </a:solidFill>
+              </a:rPr>
               <a:t>the future. </a:t>
             </a:r>
+            <a:r>
+              <a:rPr lang="en-US" smtClean="0">
+                <a:solidFill>
+                  <a:srgbClr val="FF0000"/>
+                </a:solidFill>
+              </a:rPr>
+              <a:t>FIX</a:t>
+            </a:r>
+            <a:endParaRPr lang="en-US" dirty="0">
+              <a:solidFill>
+                <a:srgbClr val="FF0000"/>
+              </a:solidFill>
+            </a:endParaRPr>
           </a:p>
           <a:p>
             <a:pPr marL="342900" indent="-342900">

</xml_diff>

<commit_message>
added cucucmber jest package and example
</commit_message>
<xml_diff>
--- a/presentation/unittestingintro.pptx
+++ b/presentation/unittestingintro.pptx
@@ -131,7 +131,7 @@
   </p:defaultTextStyle>
   <p:extLst>
     <p:ext uri="{EFAFB233-063F-42B5-8137-9DF3F51BA10A}">
-      <p15:sldGuideLst xmlns:p15="http://schemas.microsoft.com/office/powerpoint/2012/main" xmlns="">
+      <p15:sldGuideLst xmlns="" xmlns:p15="http://schemas.microsoft.com/office/powerpoint/2012/main">
         <p15:guide id="1" orient="horz" pos="99">
           <p15:clr>
             <a:srgbClr val="A4A3A4"/>
@@ -235,7 +235,7 @@
       </p15:sldGuideLst>
     </p:ext>
     <p:ext uri="{2D200454-40CA-4A62-9FC3-DE9A4176ACB9}">
-      <p15:notesGuideLst xmlns:p15="http://schemas.microsoft.com/office/powerpoint/2012/main" xmlns="">
+      <p15:notesGuideLst xmlns="" xmlns:p15="http://schemas.microsoft.com/office/powerpoint/2012/main">
         <p15:guide id="1" orient="horz" pos="2880">
           <p15:clr>
             <a:srgbClr val="A4A3A4"/>
@@ -765,6 +765,90 @@
     </a:lvl9pPr>
   </p:notesStyle>
 </p:notesMaster>
+</file>
+
+<file path=ppt/notesSlides/notesSlide1.xml><?xml version="1.0" encoding="utf-8"?>
+<p:notes xmlns:a="http://schemas.openxmlformats.org/drawingml/2006/main" xmlns:r="http://schemas.openxmlformats.org/officeDocument/2006/relationships" xmlns:p="http://schemas.openxmlformats.org/presentationml/2006/main">
+  <p:cSld>
+    <p:spTree>
+      <p:nvGrpSpPr>
+        <p:cNvPr id="1" name=""/>
+        <p:cNvGrpSpPr/>
+        <p:nvPr/>
+      </p:nvGrpSpPr>
+      <p:grpSpPr>
+        <a:xfrm>
+          <a:off x="0" y="0"/>
+          <a:ext cx="0" cy="0"/>
+          <a:chOff x="0" y="0"/>
+          <a:chExt cx="0" cy="0"/>
+        </a:xfrm>
+      </p:grpSpPr>
+      <p:sp>
+        <p:nvSpPr>
+          <p:cNvPr id="2" name="Slide Image Placeholder 1"/>
+          <p:cNvSpPr>
+            <a:spLocks noGrp="1" noRot="1" noChangeAspect="1"/>
+          </p:cNvSpPr>
+          <p:nvPr>
+            <p:ph type="sldImg"/>
+          </p:nvPr>
+        </p:nvSpPr>
+        <p:spPr/>
+      </p:sp>
+      <p:sp>
+        <p:nvSpPr>
+          <p:cNvPr id="3" name="Notes Placeholder 2"/>
+          <p:cNvSpPr>
+            <a:spLocks noGrp="1"/>
+          </p:cNvSpPr>
+          <p:nvPr>
+            <p:ph type="body" idx="1"/>
+          </p:nvPr>
+        </p:nvSpPr>
+        <p:spPr/>
+        <p:txBody>
+          <a:bodyPr/>
+          <a:lstStyle/>
+          <a:p>
+            <a:endParaRPr lang="en-US" dirty="0"/>
+          </a:p>
+        </p:txBody>
+      </p:sp>
+      <p:sp>
+        <p:nvSpPr>
+          <p:cNvPr id="4" name="Slide Number Placeholder 3"/>
+          <p:cNvSpPr>
+            <a:spLocks noGrp="1"/>
+          </p:cNvSpPr>
+          <p:nvPr>
+            <p:ph type="sldNum" sz="quarter" idx="10"/>
+          </p:nvPr>
+        </p:nvSpPr>
+        <p:spPr/>
+        <p:txBody>
+          <a:bodyPr/>
+          <a:lstStyle/>
+          <a:p>
+            <a:fld id="{C6B14F23-9491-4F52-90E2-EAB27ADD3316}" type="slidenum">
+              <a:rPr lang="en-GB" smtClean="0"/>
+              <a:t>1</a:t>
+            </a:fld>
+            <a:endParaRPr lang="en-GB"/>
+          </a:p>
+        </p:txBody>
+      </p:sp>
+    </p:spTree>
+    <p:extLst>
+      <p:ext uri="{BB962C8B-B14F-4D97-AF65-F5344CB8AC3E}">
+        <p14:creationId xmlns:p14="http://schemas.microsoft.com/office/powerpoint/2010/main" val="868174049"/>
+      </p:ext>
+    </p:extLst>
+  </p:cSld>
+  <p:clrMapOvr>
+    <a:masterClrMapping/>
+  </p:clrMapOvr>
+</p:notes>
 </file>
 
 <file path=ppt/slideLayouts/slideLayout1.xml><?xml version="1.0" encoding="utf-8"?>
@@ -4272,7 +4356,7 @@
           <p:cNvPr id="9" name="Text Placeholder 1">
             <a:extLst>
               <a:ext uri="{FF2B5EF4-FFF2-40B4-BE49-F238E27FC236}">
-                <a16:creationId xmlns:a16="http://schemas.microsoft.com/office/drawing/2014/main" xmlns="" id="{E1AEEF35-7430-4190-B1E4-D2447633D22E}"/>
+                <a16:creationId xmlns="" xmlns:a16="http://schemas.microsoft.com/office/drawing/2014/main" id="{E1AEEF35-7430-4190-B1E4-D2447633D22E}"/>
               </a:ext>
             </a:extLst>
           </p:cNvPr>
@@ -4324,7 +4408,7 @@
           <p:cNvPr id="10" name="Text Placeholder 2">
             <a:extLst>
               <a:ext uri="{FF2B5EF4-FFF2-40B4-BE49-F238E27FC236}">
-                <a16:creationId xmlns:a16="http://schemas.microsoft.com/office/drawing/2014/main" xmlns="" id="{72A9D36E-978C-40A9-B7B6-1D3B41514DBD}"/>
+                <a16:creationId xmlns="" xmlns:a16="http://schemas.microsoft.com/office/drawing/2014/main" id="{72A9D36E-978C-40A9-B7B6-1D3B41514DBD}"/>
               </a:ext>
             </a:extLst>
           </p:cNvPr>
@@ -4366,7 +4450,7 @@
           <p:cNvPr id="43" name="Text Placeholder 1">
             <a:extLst>
               <a:ext uri="{FF2B5EF4-FFF2-40B4-BE49-F238E27FC236}">
-                <a16:creationId xmlns:a16="http://schemas.microsoft.com/office/drawing/2014/main" xmlns="" id="{E1AEEF35-7430-4190-B1E4-D2447633D22E}"/>
+                <a16:creationId xmlns="" xmlns:a16="http://schemas.microsoft.com/office/drawing/2014/main" id="{E1AEEF35-7430-4190-B1E4-D2447633D22E}"/>
               </a:ext>
             </a:extLst>
           </p:cNvPr>
@@ -4418,7 +4502,7 @@
           <p:cNvPr id="44" name="Text Placeholder 2">
             <a:extLst>
               <a:ext uri="{FF2B5EF4-FFF2-40B4-BE49-F238E27FC236}">
-                <a16:creationId xmlns:a16="http://schemas.microsoft.com/office/drawing/2014/main" xmlns="" id="{72A9D36E-978C-40A9-B7B6-1D3B41514DBD}"/>
+                <a16:creationId xmlns="" xmlns:a16="http://schemas.microsoft.com/office/drawing/2014/main" id="{72A9D36E-978C-40A9-B7B6-1D3B41514DBD}"/>
               </a:ext>
             </a:extLst>
           </p:cNvPr>
@@ -4460,7 +4544,7 @@
           <p:cNvPr id="45" name="Text Placeholder 1">
             <a:extLst>
               <a:ext uri="{FF2B5EF4-FFF2-40B4-BE49-F238E27FC236}">
-                <a16:creationId xmlns:a16="http://schemas.microsoft.com/office/drawing/2014/main" xmlns="" id="{E1AEEF35-7430-4190-B1E4-D2447633D22E}"/>
+                <a16:creationId xmlns="" xmlns:a16="http://schemas.microsoft.com/office/drawing/2014/main" id="{E1AEEF35-7430-4190-B1E4-D2447633D22E}"/>
               </a:ext>
             </a:extLst>
           </p:cNvPr>
@@ -4512,7 +4596,7 @@
           <p:cNvPr id="46" name="Text Placeholder 2">
             <a:extLst>
               <a:ext uri="{FF2B5EF4-FFF2-40B4-BE49-F238E27FC236}">
-                <a16:creationId xmlns:a16="http://schemas.microsoft.com/office/drawing/2014/main" xmlns="" id="{72A9D36E-978C-40A9-B7B6-1D3B41514DBD}"/>
+                <a16:creationId xmlns="" xmlns:a16="http://schemas.microsoft.com/office/drawing/2014/main" id="{72A9D36E-978C-40A9-B7B6-1D3B41514DBD}"/>
               </a:ext>
             </a:extLst>
           </p:cNvPr>
@@ -4554,7 +4638,7 @@
           <p:cNvPr id="47" name="Text Placeholder 1">
             <a:extLst>
               <a:ext uri="{FF2B5EF4-FFF2-40B4-BE49-F238E27FC236}">
-                <a16:creationId xmlns:a16="http://schemas.microsoft.com/office/drawing/2014/main" xmlns="" id="{E1AEEF35-7430-4190-B1E4-D2447633D22E}"/>
+                <a16:creationId xmlns="" xmlns:a16="http://schemas.microsoft.com/office/drawing/2014/main" id="{E1AEEF35-7430-4190-B1E4-D2447633D22E}"/>
               </a:ext>
             </a:extLst>
           </p:cNvPr>
@@ -4606,7 +4690,7 @@
           <p:cNvPr id="48" name="Text Placeholder 2">
             <a:extLst>
               <a:ext uri="{FF2B5EF4-FFF2-40B4-BE49-F238E27FC236}">
-                <a16:creationId xmlns:a16="http://schemas.microsoft.com/office/drawing/2014/main" xmlns="" id="{72A9D36E-978C-40A9-B7B6-1D3B41514DBD}"/>
+                <a16:creationId xmlns="" xmlns:a16="http://schemas.microsoft.com/office/drawing/2014/main" id="{72A9D36E-978C-40A9-B7B6-1D3B41514DBD}"/>
               </a:ext>
             </a:extLst>
           </p:cNvPr>
@@ -10583,7 +10667,7 @@
           <p:cNvPr id="25" name="Straight Connector 24">
             <a:extLst>
               <a:ext uri="{FF2B5EF4-FFF2-40B4-BE49-F238E27FC236}">
-                <a16:creationId xmlns:a16="http://schemas.microsoft.com/office/drawing/2014/main" xmlns="" id="{2A032BDD-E6FE-4A1E-9741-60886BDBCC86}"/>
+                <a16:creationId xmlns="" xmlns:a16="http://schemas.microsoft.com/office/drawing/2014/main" id="{2A032BDD-E6FE-4A1E-9741-60886BDBCC86}"/>
               </a:ext>
             </a:extLst>
           </p:cNvPr>
@@ -12284,7 +12368,7 @@
           <p:cNvPr id="32" name="Oval 31">
             <a:extLst>
               <a:ext uri="{FF2B5EF4-FFF2-40B4-BE49-F238E27FC236}">
-                <a16:creationId xmlns:a16="http://schemas.microsoft.com/office/drawing/2014/main" xmlns="" id="{85722348-DF80-4DCF-A5FF-C530FF3D3A43}"/>
+                <a16:creationId xmlns="" xmlns:a16="http://schemas.microsoft.com/office/drawing/2014/main" id="{85722348-DF80-4DCF-A5FF-C530FF3D3A43}"/>
               </a:ext>
             </a:extLst>
           </p:cNvPr>
@@ -12367,7 +12451,7 @@
           <p:cNvPr id="46" name="Oval 45">
             <a:extLst>
               <a:ext uri="{FF2B5EF4-FFF2-40B4-BE49-F238E27FC236}">
-                <a16:creationId xmlns:a16="http://schemas.microsoft.com/office/drawing/2014/main" xmlns="" id="{85722348-DF80-4DCF-A5FF-C530FF3D3A43}"/>
+                <a16:creationId xmlns="" xmlns:a16="http://schemas.microsoft.com/office/drawing/2014/main" id="{85722348-DF80-4DCF-A5FF-C530FF3D3A43}"/>
               </a:ext>
             </a:extLst>
           </p:cNvPr>
@@ -12450,7 +12534,7 @@
           <p:cNvPr id="47" name="Oval 46">
             <a:extLst>
               <a:ext uri="{FF2B5EF4-FFF2-40B4-BE49-F238E27FC236}">
-                <a16:creationId xmlns:a16="http://schemas.microsoft.com/office/drawing/2014/main" xmlns="" id="{85722348-DF80-4DCF-A5FF-C530FF3D3A43}"/>
+                <a16:creationId xmlns="" xmlns:a16="http://schemas.microsoft.com/office/drawing/2014/main" id="{85722348-DF80-4DCF-A5FF-C530FF3D3A43}"/>
               </a:ext>
             </a:extLst>
           </p:cNvPr>
@@ -12533,7 +12617,7 @@
           <p:cNvPr id="48" name="Oval 47">
             <a:extLst>
               <a:ext uri="{FF2B5EF4-FFF2-40B4-BE49-F238E27FC236}">
-                <a16:creationId xmlns:a16="http://schemas.microsoft.com/office/drawing/2014/main" xmlns="" id="{85722348-DF80-4DCF-A5FF-C530FF3D3A43}"/>
+                <a16:creationId xmlns="" xmlns:a16="http://schemas.microsoft.com/office/drawing/2014/main" id="{85722348-DF80-4DCF-A5FF-C530FF3D3A43}"/>
               </a:ext>
             </a:extLst>
           </p:cNvPr>
@@ -12616,7 +12700,7 @@
           <p:cNvPr id="49" name="Oval 48">
             <a:extLst>
               <a:ext uri="{FF2B5EF4-FFF2-40B4-BE49-F238E27FC236}">
-                <a16:creationId xmlns:a16="http://schemas.microsoft.com/office/drawing/2014/main" xmlns="" id="{85722348-DF80-4DCF-A5FF-C530FF3D3A43}"/>
+                <a16:creationId xmlns="" xmlns:a16="http://schemas.microsoft.com/office/drawing/2014/main" id="{85722348-DF80-4DCF-A5FF-C530FF3D3A43}"/>
               </a:ext>
             </a:extLst>
           </p:cNvPr>
@@ -12943,7 +13027,7 @@
           <p:cNvPr id="25" name="Straight Connector 24">
             <a:extLst>
               <a:ext uri="{FF2B5EF4-FFF2-40B4-BE49-F238E27FC236}">
-                <a16:creationId xmlns:a16="http://schemas.microsoft.com/office/drawing/2014/main" xmlns="" id="{2A032BDD-E6FE-4A1E-9741-60886BDBCC86}"/>
+                <a16:creationId xmlns="" xmlns:a16="http://schemas.microsoft.com/office/drawing/2014/main" id="{2A032BDD-E6FE-4A1E-9741-60886BDBCC86}"/>
               </a:ext>
             </a:extLst>
           </p:cNvPr>
@@ -12991,7 +13075,7 @@
           <p:cNvPr id="34" name="Oval 33">
             <a:extLst>
               <a:ext uri="{FF2B5EF4-FFF2-40B4-BE49-F238E27FC236}">
-                <a16:creationId xmlns:a16="http://schemas.microsoft.com/office/drawing/2014/main" xmlns="" id="{3FC25BAC-207E-4BD9-B71D-67244181E8A7}"/>
+                <a16:creationId xmlns="" xmlns:a16="http://schemas.microsoft.com/office/drawing/2014/main" id="{3FC25BAC-207E-4BD9-B71D-67244181E8A7}"/>
               </a:ext>
             </a:extLst>
           </p:cNvPr>
@@ -13074,7 +13158,7 @@
           <p:cNvPr id="35" name="Oval 34">
             <a:extLst>
               <a:ext uri="{FF2B5EF4-FFF2-40B4-BE49-F238E27FC236}">
-                <a16:creationId xmlns:a16="http://schemas.microsoft.com/office/drawing/2014/main" xmlns="" id="{6ECEA8AF-DB7B-44B5-A5A9-05718517D3A8}"/>
+                <a16:creationId xmlns="" xmlns:a16="http://schemas.microsoft.com/office/drawing/2014/main" id="{6ECEA8AF-DB7B-44B5-A5A9-05718517D3A8}"/>
               </a:ext>
             </a:extLst>
           </p:cNvPr>
@@ -13157,7 +13241,7 @@
           <p:cNvPr id="36" name="Oval 35">
             <a:extLst>
               <a:ext uri="{FF2B5EF4-FFF2-40B4-BE49-F238E27FC236}">
-                <a16:creationId xmlns:a16="http://schemas.microsoft.com/office/drawing/2014/main" xmlns="" id="{76041FD2-302D-4528-B197-4818DC231D79}"/>
+                <a16:creationId xmlns="" xmlns:a16="http://schemas.microsoft.com/office/drawing/2014/main" id="{76041FD2-302D-4528-B197-4818DC231D79}"/>
               </a:ext>
             </a:extLst>
           </p:cNvPr>
@@ -13240,7 +13324,7 @@
           <p:cNvPr id="37" name="Oval 36">
             <a:extLst>
               <a:ext uri="{FF2B5EF4-FFF2-40B4-BE49-F238E27FC236}">
-                <a16:creationId xmlns:a16="http://schemas.microsoft.com/office/drawing/2014/main" xmlns="" id="{4918B22A-8AD3-4D04-AFDE-7B146EE2D7C3}"/>
+                <a16:creationId xmlns="" xmlns:a16="http://schemas.microsoft.com/office/drawing/2014/main" id="{4918B22A-8AD3-4D04-AFDE-7B146EE2D7C3}"/>
               </a:ext>
             </a:extLst>
           </p:cNvPr>
@@ -13323,7 +13407,7 @@
           <p:cNvPr id="38" name="Oval 37">
             <a:extLst>
               <a:ext uri="{FF2B5EF4-FFF2-40B4-BE49-F238E27FC236}">
-                <a16:creationId xmlns:a16="http://schemas.microsoft.com/office/drawing/2014/main" xmlns="" id="{C02F3EF3-5D54-43B3-8D77-B49AA8FBB079}"/>
+                <a16:creationId xmlns="" xmlns:a16="http://schemas.microsoft.com/office/drawing/2014/main" id="{C02F3EF3-5D54-43B3-8D77-B49AA8FBB079}"/>
               </a:ext>
             </a:extLst>
           </p:cNvPr>
@@ -13406,7 +13490,7 @@
           <p:cNvPr id="39" name="Oval 38">
             <a:extLst>
               <a:ext uri="{FF2B5EF4-FFF2-40B4-BE49-F238E27FC236}">
-                <a16:creationId xmlns:a16="http://schemas.microsoft.com/office/drawing/2014/main" xmlns="" id="{AEBB2BB8-86E4-4CA5-9D29-9AA8E28C552B}"/>
+                <a16:creationId xmlns="" xmlns:a16="http://schemas.microsoft.com/office/drawing/2014/main" id="{AEBB2BB8-86E4-4CA5-9D29-9AA8E28C552B}"/>
               </a:ext>
             </a:extLst>
           </p:cNvPr>
@@ -29956,7 +30040,15 @@
           <a:p>
             <a:r>
               <a:rPr lang="en-GB" dirty="0"/>
-              <a:t>June 4, 2019</a:t>
+              <a:t>June </a:t>
+            </a:r>
+            <a:r>
+              <a:rPr lang="en-GB" dirty="0" smtClean="0"/>
+              <a:t>24</a:t>
+            </a:r>
+            <a:r>
+              <a:rPr lang="en-GB" dirty="0"/>
+              <a:t>, 2019</a:t>
             </a:r>
           </a:p>
         </p:txBody>
@@ -29972,7 +30064,7 @@
           </p:nvPr>
         </p:nvPicPr>
         <p:blipFill>
-          <a:blip r:embed="rId2">
+          <a:blip r:embed="rId3">
             <a:extLst>
               <a:ext uri="{28A0092B-C50C-407E-A947-70E740481C1C}">
                 <a14:useLocalDpi xmlns:a14="http://schemas.microsoft.com/office/drawing/2010/main" val="0"/>
@@ -30178,21 +30270,21 @@
                 <a:gridCol w="4554908">
                   <a:extLst>
                     <a:ext uri="{9D8B030D-6E8A-4147-A177-3AD203B41FA5}">
-                      <a16:colId xmlns:a16="http://schemas.microsoft.com/office/drawing/2014/main" xmlns="" val="20000"/>
+                      <a16:colId xmlns="" xmlns:a16="http://schemas.microsoft.com/office/drawing/2014/main" val="20000"/>
                     </a:ext>
                   </a:extLst>
                 </a:gridCol>
                 <a:gridCol w="734939">
                   <a:extLst>
                     <a:ext uri="{9D8B030D-6E8A-4147-A177-3AD203B41FA5}">
-                      <a16:colId xmlns:a16="http://schemas.microsoft.com/office/drawing/2014/main" xmlns="" val="20001"/>
+                      <a16:colId xmlns="" xmlns:a16="http://schemas.microsoft.com/office/drawing/2014/main" val="20001"/>
                     </a:ext>
                   </a:extLst>
                 </a:gridCol>
                 <a:gridCol w="5888054">
                   <a:extLst>
                     <a:ext uri="{9D8B030D-6E8A-4147-A177-3AD203B41FA5}">
-                      <a16:colId xmlns:a16="http://schemas.microsoft.com/office/drawing/2014/main" xmlns="" val="20002"/>
+                      <a16:colId xmlns="" xmlns:a16="http://schemas.microsoft.com/office/drawing/2014/main" val="20002"/>
                     </a:ext>
                   </a:extLst>
                 </a:gridCol>
@@ -30589,7 +30681,7 @@
                 </a:tc>
                 <a:extLst>
                   <a:ext uri="{0D108BD9-81ED-4DB2-BD59-A6C34878D82A}">
-                    <a16:rowId xmlns:a16="http://schemas.microsoft.com/office/drawing/2014/main" xmlns="" val="10000"/>
+                    <a16:rowId xmlns="" xmlns:a16="http://schemas.microsoft.com/office/drawing/2014/main" val="10000"/>
                   </a:ext>
                 </a:extLst>
               </a:tr>
@@ -30647,21 +30739,21 @@
                 <a:gridCol w="4554908">
                   <a:extLst>
                     <a:ext uri="{9D8B030D-6E8A-4147-A177-3AD203B41FA5}">
-                      <a16:colId xmlns:a16="http://schemas.microsoft.com/office/drawing/2014/main" xmlns="" val="20000"/>
+                      <a16:colId xmlns="" xmlns:a16="http://schemas.microsoft.com/office/drawing/2014/main" val="20000"/>
                     </a:ext>
                   </a:extLst>
                 </a:gridCol>
                 <a:gridCol w="734939">
                   <a:extLst>
                     <a:ext uri="{9D8B030D-6E8A-4147-A177-3AD203B41FA5}">
-                      <a16:colId xmlns:a16="http://schemas.microsoft.com/office/drawing/2014/main" xmlns="" val="20001"/>
+                      <a16:colId xmlns="" xmlns:a16="http://schemas.microsoft.com/office/drawing/2014/main" val="20001"/>
                     </a:ext>
                   </a:extLst>
                 </a:gridCol>
                 <a:gridCol w="5888054">
                   <a:extLst>
                     <a:ext uri="{9D8B030D-6E8A-4147-A177-3AD203B41FA5}">
-                      <a16:colId xmlns:a16="http://schemas.microsoft.com/office/drawing/2014/main" xmlns="" val="20002"/>
+                      <a16:colId xmlns="" xmlns:a16="http://schemas.microsoft.com/office/drawing/2014/main" val="20002"/>
                     </a:ext>
                   </a:extLst>
                 </a:gridCol>
@@ -31715,7 +31807,7 @@
                 </a:tc>
                 <a:extLst>
                   <a:ext uri="{0D108BD9-81ED-4DB2-BD59-A6C34878D82A}">
-                    <a16:rowId xmlns:a16="http://schemas.microsoft.com/office/drawing/2014/main" xmlns="" val="10000"/>
+                    <a16:rowId xmlns="" xmlns:a16="http://schemas.microsoft.com/office/drawing/2014/main" val="10000"/>
                   </a:ext>
                 </a:extLst>
               </a:tr>
@@ -32208,7 +32300,6 @@
               <a:rPr lang="en-US" dirty="0" smtClean="0"/>
               <a:t>mock/spy</a:t>
             </a:r>
-            <a:endParaRPr lang="en-US" dirty="0" smtClean="0"/>
           </a:p>
           <a:p>
             <a:pPr marL="285750" indent="-285750">
@@ -32219,7 +32310,6 @@
               <a:rPr lang="en-US" dirty="0" smtClean="0"/>
               <a:t>Methods/functions </a:t>
             </a:r>
-            <a:endParaRPr lang="en-US" dirty="0" smtClean="0"/>
           </a:p>
           <a:p>
             <a:pPr marL="285750" indent="-285750">
@@ -32228,11 +32318,7 @@
             </a:pPr>
             <a:r>
               <a:rPr lang="en-US" dirty="0" smtClean="0"/>
-              <a:t>Manual </a:t>
-            </a:r>
-            <a:r>
-              <a:rPr lang="en-US" dirty="0" smtClean="0"/>
-              <a:t>mocking</a:t>
+              <a:t>Manual mocking</a:t>
             </a:r>
           </a:p>
           <a:p>
@@ -36269,7 +36355,7 @@
           <p:cNvPr id="3" name="Title 2">
             <a:extLst>
               <a:ext uri="{FF2B5EF4-FFF2-40B4-BE49-F238E27FC236}">
-                <a16:creationId xmlns:a16="http://schemas.microsoft.com/office/drawing/2014/main" xmlns="" id="{870FE32D-55EB-3F46-A319-A07CED6B7C01}"/>
+                <a16:creationId xmlns="" xmlns:a16="http://schemas.microsoft.com/office/drawing/2014/main" id="{870FE32D-55EB-3F46-A319-A07CED6B7C01}"/>
               </a:ext>
             </a:extLst>
           </p:cNvPr>
@@ -36298,7 +36384,7 @@
           <p:cNvPr id="6" name="Picture 5">
             <a:extLst>
               <a:ext uri="{FF2B5EF4-FFF2-40B4-BE49-F238E27FC236}">
-                <a16:creationId xmlns:a16="http://schemas.microsoft.com/office/drawing/2014/main" xmlns="" id="{94B37506-5E95-3A45-B75E-53F10C923674}"/>
+                <a16:creationId xmlns="" xmlns:a16="http://schemas.microsoft.com/office/drawing/2014/main" id="{94B37506-5E95-3A45-B75E-53F10C923674}"/>
               </a:ext>
             </a:extLst>
           </p:cNvPr>

</xml_diff>